<commit_message>
tutorial, safety.tutorial, safety.iso26262:  fixing the example models, improved documentation.
</commit_message>
<xml_diff>
--- a/code/tutorial-safety/solutions/com.mbeddr.formal.safety.users_guide/figures/figures.pptx
+++ b/code/tutorial-safety/solutions/com.mbeddr.formal.safety.users_guide/figures/figures.pptx
@@ -5,10 +5,11 @@
     <p:sldMasterId id="2147483648" r:id="rId1"/>
   </p:sldMasterIdLst>
   <p:notesMasterIdLst>
-    <p:notesMasterId r:id="rId3"/>
+    <p:notesMasterId r:id="rId4"/>
   </p:notesMasterIdLst>
   <p:sldIdLst>
     <p:sldId id="278" r:id="rId2"/>
+    <p:sldId id="279" r:id="rId3"/>
   </p:sldIdLst>
   <p:sldSz cx="9144000" cy="6858000" type="screen4x3"/>
   <p:notesSz cx="6858000" cy="9144000"/>
@@ -175,7 +176,7 @@
             </a:lvl1pPr>
           </a:lstStyle>
           <a:p>
-            <a:endParaRPr lang="en-US"/>
+            <a:endParaRPr lang="en-US" dirty="0"/>
           </a:p>
         </p:txBody>
       </p:sp>
@@ -209,9 +210,9 @@
             <a:fld id="{11812C92-0668-408F-AE44-47ECD1C69BA6}" type="datetimeFigureOut">
               <a:rPr lang="en-US" smtClean="0"/>
               <a:pPr/>
-              <a:t>12/29/2019</a:t>
+              <a:t>4/5/2021</a:t>
             </a:fld>
-            <a:endParaRPr lang="en-US"/>
+            <a:endParaRPr lang="en-US" dirty="0"/>
           </a:p>
         </p:txBody>
       </p:sp>
@@ -244,7 +245,7 @@
           <a:bodyPr vert="horz" lIns="91440" tIns="45720" rIns="91440" bIns="45720" rtlCol="0" anchor="ctr"/>
           <a:lstStyle/>
           <a:p>
-            <a:endParaRPr lang="en-US"/>
+            <a:endParaRPr lang="en-US" dirty="0"/>
           </a:p>
         </p:txBody>
       </p:sp>
@@ -337,7 +338,7 @@
             </a:lvl1pPr>
           </a:lstStyle>
           <a:p>
-            <a:endParaRPr lang="en-US"/>
+            <a:endParaRPr lang="en-US" dirty="0"/>
           </a:p>
         </p:txBody>
       </p:sp>
@@ -373,7 +374,7 @@
               <a:pPr/>
               <a:t>‹Nr.›</a:t>
             </a:fld>
-            <a:endParaRPr lang="en-US"/>
+            <a:endParaRPr lang="en-US" dirty="0"/>
           </a:p>
         </p:txBody>
       </p:sp>
@@ -655,9 +656,9 @@
             <a:fld id="{1BA50D42-C9CD-4801-B293-61D1F53EC57E}" type="datetimeFigureOut">
               <a:rPr lang="de-DE" smtClean="0"/>
               <a:pPr/>
-              <a:t>29.12.2019</a:t>
+              <a:t>05.04.2021</a:t>
             </a:fld>
-            <a:endParaRPr lang="de-DE"/>
+            <a:endParaRPr lang="de-DE" dirty="0"/>
           </a:p>
         </p:txBody>
       </p:sp>
@@ -676,7 +677,7 @@
           <a:bodyPr/>
           <a:lstStyle/>
           <a:p>
-            <a:endParaRPr lang="de-DE"/>
+            <a:endParaRPr lang="de-DE" dirty="0"/>
           </a:p>
         </p:txBody>
       </p:sp>
@@ -700,7 +701,7 @@
               <a:pPr/>
               <a:t>‹Nr.›</a:t>
             </a:fld>
-            <a:endParaRPr lang="de-DE"/>
+            <a:endParaRPr lang="de-DE" dirty="0"/>
           </a:p>
         </p:txBody>
       </p:sp>
@@ -820,9 +821,9 @@
             <a:fld id="{1BA50D42-C9CD-4801-B293-61D1F53EC57E}" type="datetimeFigureOut">
               <a:rPr lang="de-DE" smtClean="0"/>
               <a:pPr/>
-              <a:t>29.12.2019</a:t>
+              <a:t>05.04.2021</a:t>
             </a:fld>
-            <a:endParaRPr lang="de-DE"/>
+            <a:endParaRPr lang="de-DE" dirty="0"/>
           </a:p>
         </p:txBody>
       </p:sp>
@@ -841,7 +842,7 @@
           <a:bodyPr/>
           <a:lstStyle/>
           <a:p>
-            <a:endParaRPr lang="de-DE"/>
+            <a:endParaRPr lang="de-DE" dirty="0"/>
           </a:p>
         </p:txBody>
       </p:sp>
@@ -865,7 +866,7 @@
               <a:pPr/>
               <a:t>‹Nr.›</a:t>
             </a:fld>
-            <a:endParaRPr lang="de-DE"/>
+            <a:endParaRPr lang="de-DE" dirty="0"/>
           </a:p>
         </p:txBody>
       </p:sp>
@@ -995,9 +996,9 @@
             <a:fld id="{1BA50D42-C9CD-4801-B293-61D1F53EC57E}" type="datetimeFigureOut">
               <a:rPr lang="de-DE" smtClean="0"/>
               <a:pPr/>
-              <a:t>29.12.2019</a:t>
+              <a:t>05.04.2021</a:t>
             </a:fld>
-            <a:endParaRPr lang="de-DE"/>
+            <a:endParaRPr lang="de-DE" dirty="0"/>
           </a:p>
         </p:txBody>
       </p:sp>
@@ -1016,7 +1017,7 @@
           <a:bodyPr/>
           <a:lstStyle/>
           <a:p>
-            <a:endParaRPr lang="de-DE"/>
+            <a:endParaRPr lang="de-DE" dirty="0"/>
           </a:p>
         </p:txBody>
       </p:sp>
@@ -1040,7 +1041,7 @@
               <a:pPr/>
               <a:t>‹Nr.›</a:t>
             </a:fld>
-            <a:endParaRPr lang="de-DE"/>
+            <a:endParaRPr lang="de-DE" dirty="0"/>
           </a:p>
         </p:txBody>
       </p:sp>
@@ -1160,9 +1161,9 @@
             <a:fld id="{1BA50D42-C9CD-4801-B293-61D1F53EC57E}" type="datetimeFigureOut">
               <a:rPr lang="de-DE" smtClean="0"/>
               <a:pPr/>
-              <a:t>29.12.2019</a:t>
+              <a:t>05.04.2021</a:t>
             </a:fld>
-            <a:endParaRPr lang="de-DE"/>
+            <a:endParaRPr lang="de-DE" dirty="0"/>
           </a:p>
         </p:txBody>
       </p:sp>
@@ -1181,7 +1182,7 @@
           <a:bodyPr/>
           <a:lstStyle/>
           <a:p>
-            <a:endParaRPr lang="de-DE"/>
+            <a:endParaRPr lang="de-DE" dirty="0"/>
           </a:p>
         </p:txBody>
       </p:sp>
@@ -1205,7 +1206,7 @@
               <a:pPr/>
               <a:t>‹Nr.›</a:t>
             </a:fld>
-            <a:endParaRPr lang="de-DE"/>
+            <a:endParaRPr lang="de-DE" dirty="0"/>
           </a:p>
         </p:txBody>
       </p:sp>
@@ -1402,9 +1403,9 @@
             <a:fld id="{1BA50D42-C9CD-4801-B293-61D1F53EC57E}" type="datetimeFigureOut">
               <a:rPr lang="de-DE" smtClean="0"/>
               <a:pPr/>
-              <a:t>29.12.2019</a:t>
+              <a:t>05.04.2021</a:t>
             </a:fld>
-            <a:endParaRPr lang="de-DE"/>
+            <a:endParaRPr lang="de-DE" dirty="0"/>
           </a:p>
         </p:txBody>
       </p:sp>
@@ -1423,7 +1424,7 @@
           <a:bodyPr/>
           <a:lstStyle/>
           <a:p>
-            <a:endParaRPr lang="de-DE"/>
+            <a:endParaRPr lang="de-DE" dirty="0"/>
           </a:p>
         </p:txBody>
       </p:sp>
@@ -1447,7 +1448,7 @@
               <a:pPr/>
               <a:t>‹Nr.›</a:t>
             </a:fld>
-            <a:endParaRPr lang="de-DE"/>
+            <a:endParaRPr lang="de-DE" dirty="0"/>
           </a:p>
         </p:txBody>
       </p:sp>
@@ -1684,9 +1685,9 @@
             <a:fld id="{1BA50D42-C9CD-4801-B293-61D1F53EC57E}" type="datetimeFigureOut">
               <a:rPr lang="de-DE" smtClean="0"/>
               <a:pPr/>
-              <a:t>29.12.2019</a:t>
+              <a:t>05.04.2021</a:t>
             </a:fld>
-            <a:endParaRPr lang="de-DE"/>
+            <a:endParaRPr lang="de-DE" dirty="0"/>
           </a:p>
         </p:txBody>
       </p:sp>
@@ -1705,7 +1706,7 @@
           <a:bodyPr/>
           <a:lstStyle/>
           <a:p>
-            <a:endParaRPr lang="de-DE"/>
+            <a:endParaRPr lang="de-DE" dirty="0"/>
           </a:p>
         </p:txBody>
       </p:sp>
@@ -1729,7 +1730,7 @@
               <a:pPr/>
               <a:t>‹Nr.›</a:t>
             </a:fld>
-            <a:endParaRPr lang="de-DE"/>
+            <a:endParaRPr lang="de-DE" dirty="0"/>
           </a:p>
         </p:txBody>
       </p:sp>
@@ -2100,9 +2101,9 @@
             <a:fld id="{1BA50D42-C9CD-4801-B293-61D1F53EC57E}" type="datetimeFigureOut">
               <a:rPr lang="de-DE" smtClean="0"/>
               <a:pPr/>
-              <a:t>29.12.2019</a:t>
+              <a:t>05.04.2021</a:t>
             </a:fld>
-            <a:endParaRPr lang="de-DE"/>
+            <a:endParaRPr lang="de-DE" dirty="0"/>
           </a:p>
         </p:txBody>
       </p:sp>
@@ -2121,7 +2122,7 @@
           <a:bodyPr/>
           <a:lstStyle/>
           <a:p>
-            <a:endParaRPr lang="de-DE"/>
+            <a:endParaRPr lang="de-DE" dirty="0"/>
           </a:p>
         </p:txBody>
       </p:sp>
@@ -2145,7 +2146,7 @@
               <a:pPr/>
               <a:t>‹Nr.›</a:t>
             </a:fld>
-            <a:endParaRPr lang="de-DE"/>
+            <a:endParaRPr lang="de-DE" dirty="0"/>
           </a:p>
         </p:txBody>
       </p:sp>
@@ -2214,9 +2215,9 @@
             <a:fld id="{1BA50D42-C9CD-4801-B293-61D1F53EC57E}" type="datetimeFigureOut">
               <a:rPr lang="de-DE" smtClean="0"/>
               <a:pPr/>
-              <a:t>29.12.2019</a:t>
+              <a:t>05.04.2021</a:t>
             </a:fld>
-            <a:endParaRPr lang="de-DE"/>
+            <a:endParaRPr lang="de-DE" dirty="0"/>
           </a:p>
         </p:txBody>
       </p:sp>
@@ -2235,7 +2236,7 @@
           <a:bodyPr/>
           <a:lstStyle/>
           <a:p>
-            <a:endParaRPr lang="de-DE"/>
+            <a:endParaRPr lang="de-DE" dirty="0"/>
           </a:p>
         </p:txBody>
       </p:sp>
@@ -2259,7 +2260,7 @@
               <a:pPr/>
               <a:t>‹Nr.›</a:t>
             </a:fld>
-            <a:endParaRPr lang="de-DE"/>
+            <a:endParaRPr lang="de-DE" dirty="0"/>
           </a:p>
         </p:txBody>
       </p:sp>
@@ -2306,9 +2307,9 @@
             <a:fld id="{1BA50D42-C9CD-4801-B293-61D1F53EC57E}" type="datetimeFigureOut">
               <a:rPr lang="de-DE" smtClean="0"/>
               <a:pPr/>
-              <a:t>29.12.2019</a:t>
+              <a:t>05.04.2021</a:t>
             </a:fld>
-            <a:endParaRPr lang="de-DE"/>
+            <a:endParaRPr lang="de-DE" dirty="0"/>
           </a:p>
         </p:txBody>
       </p:sp>
@@ -2327,7 +2328,7 @@
           <a:bodyPr/>
           <a:lstStyle/>
           <a:p>
-            <a:endParaRPr lang="de-DE"/>
+            <a:endParaRPr lang="de-DE" dirty="0"/>
           </a:p>
         </p:txBody>
       </p:sp>
@@ -2351,7 +2352,7 @@
               <a:pPr/>
               <a:t>‹Nr.›</a:t>
             </a:fld>
-            <a:endParaRPr lang="de-DE"/>
+            <a:endParaRPr lang="de-DE" dirty="0"/>
           </a:p>
         </p:txBody>
       </p:sp>
@@ -2578,9 +2579,9 @@
             <a:fld id="{1BA50D42-C9CD-4801-B293-61D1F53EC57E}" type="datetimeFigureOut">
               <a:rPr lang="de-DE" smtClean="0"/>
               <a:pPr/>
-              <a:t>29.12.2019</a:t>
+              <a:t>05.04.2021</a:t>
             </a:fld>
-            <a:endParaRPr lang="de-DE"/>
+            <a:endParaRPr lang="de-DE" dirty="0"/>
           </a:p>
         </p:txBody>
       </p:sp>
@@ -2599,7 +2600,7 @@
           <a:bodyPr/>
           <a:lstStyle/>
           <a:p>
-            <a:endParaRPr lang="de-DE"/>
+            <a:endParaRPr lang="de-DE" dirty="0"/>
           </a:p>
         </p:txBody>
       </p:sp>
@@ -2623,7 +2624,7 @@
               <a:pPr/>
               <a:t>‹Nr.›</a:t>
             </a:fld>
-            <a:endParaRPr lang="de-DE"/>
+            <a:endParaRPr lang="de-DE" dirty="0"/>
           </a:p>
         </p:txBody>
       </p:sp>
@@ -2740,7 +2741,7 @@
             </a:lvl9pPr>
           </a:lstStyle>
           <a:p>
-            <a:endParaRPr lang="de-DE"/>
+            <a:endParaRPr lang="de-DE" dirty="0"/>
           </a:p>
         </p:txBody>
       </p:sp>
@@ -2827,9 +2828,9 @@
             <a:fld id="{1BA50D42-C9CD-4801-B293-61D1F53EC57E}" type="datetimeFigureOut">
               <a:rPr lang="de-DE" smtClean="0"/>
               <a:pPr/>
-              <a:t>29.12.2019</a:t>
+              <a:t>05.04.2021</a:t>
             </a:fld>
-            <a:endParaRPr lang="de-DE"/>
+            <a:endParaRPr lang="de-DE" dirty="0"/>
           </a:p>
         </p:txBody>
       </p:sp>
@@ -2848,7 +2849,7 @@
           <a:bodyPr/>
           <a:lstStyle/>
           <a:p>
-            <a:endParaRPr lang="de-DE"/>
+            <a:endParaRPr lang="de-DE" dirty="0"/>
           </a:p>
         </p:txBody>
       </p:sp>
@@ -2872,7 +2873,7 @@
               <a:pPr/>
               <a:t>‹Nr.›</a:t>
             </a:fld>
-            <a:endParaRPr lang="de-DE"/>
+            <a:endParaRPr lang="de-DE" dirty="0"/>
           </a:p>
         </p:txBody>
       </p:sp>
@@ -3035,9 +3036,9 @@
             <a:fld id="{1BA50D42-C9CD-4801-B293-61D1F53EC57E}" type="datetimeFigureOut">
               <a:rPr lang="de-DE" smtClean="0"/>
               <a:pPr/>
-              <a:t>29.12.2019</a:t>
+              <a:t>05.04.2021</a:t>
             </a:fld>
-            <a:endParaRPr lang="de-DE"/>
+            <a:endParaRPr lang="de-DE" dirty="0"/>
           </a:p>
         </p:txBody>
       </p:sp>
@@ -3074,7 +3075,7 @@
             </a:lvl1pPr>
           </a:lstStyle>
           <a:p>
-            <a:endParaRPr lang="de-DE"/>
+            <a:endParaRPr lang="de-DE" dirty="0"/>
           </a:p>
         </p:txBody>
       </p:sp>
@@ -3116,7 +3117,7 @@
               <a:pPr/>
               <a:t>‹Nr.›</a:t>
             </a:fld>
-            <a:endParaRPr lang="de-DE"/>
+            <a:endParaRPr lang="de-DE" dirty="0"/>
           </a:p>
         </p:txBody>
       </p:sp>
@@ -3392,6 +3393,11 @@
 <file path=ppt/slides/slide1.xml><?xml version="1.0" encoding="utf-8"?>
 <p:sld xmlns:a="http://schemas.openxmlformats.org/drawingml/2006/main" xmlns:r="http://schemas.openxmlformats.org/officeDocument/2006/relationships" xmlns:p="http://schemas.openxmlformats.org/presentationml/2006/main">
   <p:cSld>
+    <p:bg>
+      <p:bgRef idx="1001">
+        <a:schemeClr val="bg1"/>
+      </p:bgRef>
+    </p:bg>
     <p:spTree>
       <p:nvGrpSpPr>
         <p:cNvPr id="1" name=""/>
@@ -3421,7 +3427,7 @@
           <p:nvPr/>
         </p:nvPicPr>
         <p:blipFill>
-          <a:blip r:embed="rId2"/>
+          <a:blip r:embed="rId3"/>
           <a:stretch>
             <a:fillRect/>
           </a:stretch>
@@ -3545,7 +3551,641 @@
     </p:extLst>
   </p:cSld>
   <p:clrMapOvr>
-    <a:masterClrMapping/>
+    <a:overrideClrMapping bg1="lt1" tx1="dk1" bg2="lt2" tx2="dk2" accent1="accent1" accent2="accent2" accent3="accent3" accent4="accent4" accent5="accent5" accent6="accent6" hlink="hlink" folHlink="folHlink"/>
+  </p:clrMapOvr>
+</p:sld>
+</file>
+
+<file path=ppt/slides/slide2.xml><?xml version="1.0" encoding="utf-8"?>
+<p:sld xmlns:a="http://schemas.openxmlformats.org/drawingml/2006/main" xmlns:r="http://schemas.openxmlformats.org/officeDocument/2006/relationships" xmlns:p="http://schemas.openxmlformats.org/presentationml/2006/main">
+  <p:cSld>
+    <p:bg>
+      <p:bgRef idx="1001">
+        <a:schemeClr val="bg1"/>
+      </p:bgRef>
+    </p:bg>
+    <p:spTree>
+      <p:nvGrpSpPr>
+        <p:cNvPr id="1" name=""/>
+        <p:cNvGrpSpPr/>
+        <p:nvPr/>
+      </p:nvGrpSpPr>
+      <p:grpSpPr>
+        <a:xfrm>
+          <a:off x="0" y="0"/>
+          <a:ext cx="0" cy="0"/>
+          <a:chOff x="0" y="0"/>
+          <a:chExt cx="0" cy="0"/>
+        </a:xfrm>
+      </p:grpSpPr>
+      <p:pic>
+        <p:nvPicPr>
+          <p:cNvPr id="4" name="Grafik 3"/>
+          <p:cNvPicPr>
+            <a:picLocks noChangeAspect="1"/>
+          </p:cNvPicPr>
+          <p:nvPr/>
+        </p:nvPicPr>
+        <p:blipFill rotWithShape="1">
+          <a:blip r:embed="rId3"/>
+          <a:srcRect l="27738" r="23357" b="22179"/>
+          <a:stretch/>
+        </p:blipFill>
+        <p:spPr>
+          <a:xfrm>
+            <a:off x="1403648" y="260648"/>
+            <a:ext cx="5544616" cy="4717061"/>
+          </a:xfrm>
+          <a:prstGeom prst="rect">
+            <a:avLst/>
+          </a:prstGeom>
+          <a:ln w="38100" cap="sq">
+            <a:solidFill>
+              <a:srgbClr val="000000"/>
+            </a:solidFill>
+            <a:prstDash val="solid"/>
+            <a:miter lim="800000"/>
+          </a:ln>
+          <a:effectLst>
+            <a:outerShdw blurRad="50800" dist="38100" dir="2700000" algn="tl" rotWithShape="0">
+              <a:srgbClr val="000000">
+                <a:alpha val="43000"/>
+              </a:srgbClr>
+            </a:outerShdw>
+          </a:effectLst>
+        </p:spPr>
+      </p:pic>
+      <p:sp>
+        <p:nvSpPr>
+          <p:cNvPr id="5" name="Textfeld 4">
+            <a:extLst>
+              <a:ext uri="{FF2B5EF4-FFF2-40B4-BE49-F238E27FC236}">
+                <a16:creationId xmlns:a16="http://schemas.microsoft.com/office/drawing/2014/main" id="{8AE1BC7E-7459-4696-B1E1-0450005DA9EF}"/>
+              </a:ext>
+            </a:extLst>
+          </p:cNvPr>
+          <p:cNvSpPr txBox="1"/>
+          <p:nvPr/>
+        </p:nvSpPr>
+        <p:spPr>
+          <a:xfrm>
+            <a:off x="1475656" y="1100621"/>
+            <a:ext cx="4824536" cy="461665"/>
+          </a:xfrm>
+          <a:prstGeom prst="rect">
+            <a:avLst/>
+          </a:prstGeom>
+          <a:solidFill>
+            <a:schemeClr val="accent6">
+              <a:lumMod val="20000"/>
+              <a:lumOff val="80000"/>
+              <a:alpha val="65000"/>
+            </a:schemeClr>
+          </a:solidFill>
+        </p:spPr>
+        <p:txBody>
+          <a:bodyPr wrap="square" rtlCol="0">
+            <a:spAutoFit/>
+          </a:bodyPr>
+          <a:lstStyle/>
+          <a:p>
+            <a:pPr algn="ctr"/>
+            <a:r>
+              <a:rPr lang="en-US" sz="1200" b="1" dirty="0" smtClean="0">
+                <a:solidFill>
+                  <a:srgbClr val="C00000"/>
+                </a:solidFill>
+              </a:rPr>
+              <a:t>By selecting a box (controller) or line (control/feedback actions), we can change its </a:t>
+            </a:r>
+            <a:r>
+              <a:rPr lang="de-DE" sz="1200" b="1" dirty="0" smtClean="0">
+                <a:solidFill>
+                  <a:srgbClr val="C00000"/>
+                </a:solidFill>
+              </a:rPr>
+              <a:t>name</a:t>
+            </a:r>
+            <a:r>
+              <a:rPr lang="de-DE" sz="1200" b="1" dirty="0" smtClean="0">
+                <a:solidFill>
+                  <a:srgbClr val="C00000"/>
+                </a:solidFill>
+              </a:rPr>
+              <a:t>, </a:t>
+            </a:r>
+            <a:r>
+              <a:rPr lang="de-DE" sz="1200" b="1" dirty="0" smtClean="0">
+                <a:solidFill>
+                  <a:srgbClr val="C00000"/>
+                </a:solidFill>
+              </a:rPr>
+              <a:t>description</a:t>
+            </a:r>
+            <a:r>
+              <a:rPr lang="de-DE" sz="1200" b="1" dirty="0" smtClean="0">
+                <a:solidFill>
+                  <a:srgbClr val="C00000"/>
+                </a:solidFill>
+              </a:rPr>
+              <a:t>, </a:t>
+            </a:r>
+            <a:r>
+              <a:rPr lang="de-DE" sz="1200" b="1" dirty="0" smtClean="0">
+                <a:solidFill>
+                  <a:srgbClr val="C00000"/>
+                </a:solidFill>
+              </a:rPr>
+              <a:t>etc</a:t>
+            </a:r>
+            <a:r>
+              <a:rPr lang="de-DE" sz="1200" b="1" dirty="0" smtClean="0">
+                <a:solidFill>
+                  <a:srgbClr val="C00000"/>
+                </a:solidFill>
+              </a:rPr>
+              <a:t> in </a:t>
+            </a:r>
+            <a:r>
+              <a:rPr lang="de-DE" sz="1200" b="1" dirty="0" smtClean="0">
+                <a:solidFill>
+                  <a:srgbClr val="C00000"/>
+                </a:solidFill>
+              </a:rPr>
+              <a:t>the</a:t>
+            </a:r>
+            <a:r>
+              <a:rPr lang="de-DE" sz="1200" b="1" dirty="0" smtClean="0">
+                <a:solidFill>
+                  <a:srgbClr val="C00000"/>
+                </a:solidFill>
+              </a:rPr>
+              <a:t> „</a:t>
+            </a:r>
+            <a:r>
+              <a:rPr lang="de-DE" sz="1200" b="1" dirty="0" smtClean="0">
+                <a:solidFill>
+                  <a:srgbClr val="C00000"/>
+                </a:solidFill>
+              </a:rPr>
+              <a:t>Inspector</a:t>
+            </a:r>
+            <a:r>
+              <a:rPr lang="de-DE" sz="1200" b="1" dirty="0" smtClean="0">
+                <a:solidFill>
+                  <a:srgbClr val="C00000"/>
+                </a:solidFill>
+              </a:rPr>
+              <a:t>“ </a:t>
+            </a:r>
+            <a:r>
+              <a:rPr lang="de-DE" sz="1200" b="1" dirty="0" smtClean="0">
+                <a:solidFill>
+                  <a:srgbClr val="C00000"/>
+                </a:solidFill>
+              </a:rPr>
+              <a:t>window</a:t>
+            </a:r>
+            <a:r>
+              <a:rPr lang="de-DE" sz="1200" b="1" dirty="0" smtClean="0">
+                <a:solidFill>
+                  <a:srgbClr val="C00000"/>
+                </a:solidFill>
+              </a:rPr>
+              <a:t>.</a:t>
+            </a:r>
+            <a:endParaRPr lang="en-US" sz="1200" b="1" dirty="0">
+              <a:solidFill>
+                <a:srgbClr val="C00000"/>
+              </a:solidFill>
+            </a:endParaRPr>
+          </a:p>
+        </p:txBody>
+      </p:sp>
+      <p:cxnSp>
+        <p:nvCxnSpPr>
+          <p:cNvPr id="6" name="Gerade Verbindung mit Pfeil 5">
+            <a:extLst>
+              <a:ext uri="{FF2B5EF4-FFF2-40B4-BE49-F238E27FC236}">
+                <a16:creationId xmlns:a16="http://schemas.microsoft.com/office/drawing/2014/main" id="{C9A631E0-5FDC-40B9-B437-86D216BBDCC2}"/>
+              </a:ext>
+            </a:extLst>
+          </p:cNvPr>
+          <p:cNvCxnSpPr>
+            <a:cxnSpLocks/>
+          </p:cNvCxnSpPr>
+          <p:nvPr/>
+        </p:nvCxnSpPr>
+        <p:spPr>
+          <a:xfrm flipH="1">
+            <a:off x="2555776" y="1616048"/>
+            <a:ext cx="432048" cy="378299"/>
+          </a:xfrm>
+          <a:prstGeom prst="straightConnector1">
+            <a:avLst/>
+          </a:prstGeom>
+          <a:ln w="19050">
+            <a:solidFill>
+              <a:srgbClr val="C00000"/>
+            </a:solidFill>
+            <a:tailEnd type="triangle"/>
+          </a:ln>
+        </p:spPr>
+        <p:style>
+          <a:lnRef idx="1">
+            <a:schemeClr val="accent1"/>
+          </a:lnRef>
+          <a:fillRef idx="0">
+            <a:schemeClr val="accent1"/>
+          </a:fillRef>
+          <a:effectRef idx="0">
+            <a:schemeClr val="accent1"/>
+          </a:effectRef>
+          <a:fontRef idx="minor">
+            <a:schemeClr val="tx1"/>
+          </a:fontRef>
+        </p:style>
+      </p:cxnSp>
+      <p:cxnSp>
+        <p:nvCxnSpPr>
+          <p:cNvPr id="9" name="Gerade Verbindung mit Pfeil 8">
+            <a:extLst>
+              <a:ext uri="{FF2B5EF4-FFF2-40B4-BE49-F238E27FC236}">
+                <a16:creationId xmlns:a16="http://schemas.microsoft.com/office/drawing/2014/main" id="{C9A631E0-5FDC-40B9-B437-86D216BBDCC2}"/>
+              </a:ext>
+            </a:extLst>
+          </p:cNvPr>
+          <p:cNvCxnSpPr>
+            <a:cxnSpLocks/>
+          </p:cNvCxnSpPr>
+          <p:nvPr/>
+        </p:nvCxnSpPr>
+        <p:spPr>
+          <a:xfrm>
+            <a:off x="1691680" y="1616048"/>
+            <a:ext cx="0" cy="2245000"/>
+          </a:xfrm>
+          <a:prstGeom prst="straightConnector1">
+            <a:avLst/>
+          </a:prstGeom>
+          <a:ln w="19050">
+            <a:solidFill>
+              <a:srgbClr val="C00000"/>
+            </a:solidFill>
+            <a:tailEnd type="triangle"/>
+          </a:ln>
+        </p:spPr>
+        <p:style>
+          <a:lnRef idx="1">
+            <a:schemeClr val="accent1"/>
+          </a:lnRef>
+          <a:fillRef idx="0">
+            <a:schemeClr val="accent1"/>
+          </a:fillRef>
+          <a:effectRef idx="0">
+            <a:schemeClr val="accent1"/>
+          </a:effectRef>
+          <a:fontRef idx="minor">
+            <a:schemeClr val="tx1"/>
+          </a:fontRef>
+        </p:style>
+      </p:cxnSp>
+      <p:sp>
+        <p:nvSpPr>
+          <p:cNvPr id="12" name="Textfeld 11">
+            <a:extLst>
+              <a:ext uri="{FF2B5EF4-FFF2-40B4-BE49-F238E27FC236}">
+                <a16:creationId xmlns:a16="http://schemas.microsoft.com/office/drawing/2014/main" id="{8AE1BC7E-7459-4696-B1E1-0450005DA9EF}"/>
+              </a:ext>
+            </a:extLst>
+          </p:cNvPr>
+          <p:cNvSpPr txBox="1"/>
+          <p:nvPr/>
+        </p:nvSpPr>
+        <p:spPr>
+          <a:xfrm>
+            <a:off x="3851920" y="3676427"/>
+            <a:ext cx="3024336" cy="646331"/>
+          </a:xfrm>
+          <a:prstGeom prst="rect">
+            <a:avLst/>
+          </a:prstGeom>
+          <a:solidFill>
+            <a:schemeClr val="accent6">
+              <a:lumMod val="20000"/>
+              <a:lumOff val="80000"/>
+              <a:alpha val="65000"/>
+            </a:schemeClr>
+          </a:solidFill>
+        </p:spPr>
+        <p:txBody>
+          <a:bodyPr wrap="square" rtlCol="0">
+            <a:spAutoFit/>
+          </a:bodyPr>
+          <a:lstStyle/>
+          <a:p>
+            <a:pPr algn="ctr"/>
+            <a:r>
+              <a:rPr lang="de-DE" sz="1200" b="1" dirty="0" smtClean="0">
+                <a:solidFill>
+                  <a:srgbClr val="C00000"/>
+                </a:solidFill>
+              </a:rPr>
+              <a:t>Pressing</a:t>
+            </a:r>
+            <a:r>
+              <a:rPr lang="de-DE" sz="1200" b="1" dirty="0" smtClean="0">
+                <a:solidFill>
+                  <a:srgbClr val="C00000"/>
+                </a:solidFill>
+              </a:rPr>
+              <a:t> </a:t>
+            </a:r>
+            <a:r>
+              <a:rPr lang="de-DE" sz="1200" b="1" dirty="0" smtClean="0">
+                <a:solidFill>
+                  <a:srgbClr val="C00000"/>
+                </a:solidFill>
+              </a:rPr>
+              <a:t>Alt+Enter</a:t>
+            </a:r>
+            <a:r>
+              <a:rPr lang="de-DE" sz="1200" b="1" dirty="0" smtClean="0">
+                <a:solidFill>
+                  <a:srgbClr val="C00000"/>
+                </a:solidFill>
+              </a:rPr>
+              <a:t> on a box (</a:t>
+            </a:r>
+            <a:r>
+              <a:rPr lang="de-DE" sz="1200" b="1" dirty="0" smtClean="0">
+                <a:solidFill>
+                  <a:srgbClr val="C00000"/>
+                </a:solidFill>
+              </a:rPr>
+              <a:t>controller</a:t>
+            </a:r>
+            <a:r>
+              <a:rPr lang="de-DE" sz="1200" b="1" dirty="0" smtClean="0">
+                <a:solidFill>
+                  <a:srgbClr val="C00000"/>
+                </a:solidFill>
+              </a:rPr>
+              <a:t>) </a:t>
+            </a:r>
+            <a:r>
+              <a:rPr lang="de-DE" sz="1200" b="1" dirty="0" smtClean="0">
+                <a:solidFill>
+                  <a:srgbClr val="C00000"/>
+                </a:solidFill>
+              </a:rPr>
+              <a:t>opens</a:t>
+            </a:r>
+            <a:r>
+              <a:rPr lang="de-DE" sz="1200" b="1" dirty="0" smtClean="0">
+                <a:solidFill>
+                  <a:srgbClr val="C00000"/>
+                </a:solidFill>
+              </a:rPr>
+              <a:t> </a:t>
+            </a:r>
+            <a:r>
+              <a:rPr lang="de-DE" sz="1200" b="1" dirty="0" smtClean="0">
+                <a:solidFill>
+                  <a:srgbClr val="C00000"/>
+                </a:solidFill>
+              </a:rPr>
+              <a:t>the</a:t>
+            </a:r>
+            <a:r>
+              <a:rPr lang="de-DE" sz="1200" b="1" dirty="0" smtClean="0">
+                <a:solidFill>
+                  <a:srgbClr val="C00000"/>
+                </a:solidFill>
+              </a:rPr>
+              <a:t> </a:t>
+            </a:r>
+            <a:r>
+              <a:rPr lang="de-DE" sz="1200" b="1" dirty="0" smtClean="0">
+                <a:solidFill>
+                  <a:srgbClr val="C00000"/>
+                </a:solidFill>
+              </a:rPr>
+              <a:t>intentions</a:t>
+            </a:r>
+            <a:r>
+              <a:rPr lang="de-DE" sz="1200" b="1" dirty="0" smtClean="0">
+                <a:solidFill>
+                  <a:srgbClr val="C00000"/>
+                </a:solidFill>
+              </a:rPr>
+              <a:t> </a:t>
+            </a:r>
+            <a:r>
+              <a:rPr lang="de-DE" sz="1200" b="1" dirty="0" smtClean="0">
+                <a:solidFill>
+                  <a:srgbClr val="C00000"/>
+                </a:solidFill>
+              </a:rPr>
+              <a:t>menu</a:t>
+            </a:r>
+            <a:r>
+              <a:rPr lang="de-DE" sz="1200" b="1" dirty="0" smtClean="0">
+                <a:solidFill>
+                  <a:srgbClr val="C00000"/>
+                </a:solidFill>
+              </a:rPr>
+              <a:t> </a:t>
+            </a:r>
+            <a:r>
+              <a:rPr lang="de-DE" sz="1200" b="1" dirty="0" smtClean="0">
+                <a:solidFill>
+                  <a:srgbClr val="C00000"/>
+                </a:solidFill>
+              </a:rPr>
+              <a:t>which</a:t>
+            </a:r>
+            <a:r>
+              <a:rPr lang="de-DE" sz="1200" b="1" dirty="0" smtClean="0">
+                <a:solidFill>
+                  <a:srgbClr val="C00000"/>
+                </a:solidFill>
+              </a:rPr>
+              <a:t> </a:t>
+            </a:r>
+            <a:r>
+              <a:rPr lang="de-DE" sz="1200" b="1" dirty="0" smtClean="0">
+                <a:solidFill>
+                  <a:srgbClr val="C00000"/>
+                </a:solidFill>
+              </a:rPr>
+              <a:t>allows</a:t>
+            </a:r>
+            <a:r>
+              <a:rPr lang="de-DE" sz="1200" b="1" dirty="0" smtClean="0">
+                <a:solidFill>
+                  <a:srgbClr val="C00000"/>
+                </a:solidFill>
+              </a:rPr>
+              <a:t> </a:t>
+            </a:r>
+            <a:r>
+              <a:rPr lang="de-DE" sz="1200" b="1" dirty="0" smtClean="0">
+                <a:solidFill>
+                  <a:srgbClr val="C00000"/>
+                </a:solidFill>
+              </a:rPr>
+              <a:t>the</a:t>
+            </a:r>
+            <a:r>
+              <a:rPr lang="de-DE" sz="1200" b="1" dirty="0" smtClean="0">
+                <a:solidFill>
+                  <a:srgbClr val="C00000"/>
+                </a:solidFill>
+              </a:rPr>
+              <a:t> </a:t>
+            </a:r>
+            <a:r>
+              <a:rPr lang="de-DE" sz="1200" b="1" dirty="0" smtClean="0">
+                <a:solidFill>
+                  <a:srgbClr val="C00000"/>
+                </a:solidFill>
+              </a:rPr>
+              <a:t>creation</a:t>
+            </a:r>
+            <a:r>
+              <a:rPr lang="de-DE" sz="1200" b="1" dirty="0" smtClean="0">
+                <a:solidFill>
+                  <a:srgbClr val="C00000"/>
+                </a:solidFill>
+              </a:rPr>
+              <a:t> </a:t>
+            </a:r>
+            <a:r>
+              <a:rPr lang="de-DE" sz="1200" b="1" dirty="0" smtClean="0">
+                <a:solidFill>
+                  <a:srgbClr val="C00000"/>
+                </a:solidFill>
+              </a:rPr>
+              <a:t>of</a:t>
+            </a:r>
+            <a:r>
+              <a:rPr lang="de-DE" sz="1200" b="1" dirty="0" smtClean="0">
+                <a:solidFill>
+                  <a:srgbClr val="C00000"/>
+                </a:solidFill>
+              </a:rPr>
+              <a:t> </a:t>
+            </a:r>
+            <a:r>
+              <a:rPr lang="de-DE" sz="1200" b="1" dirty="0" smtClean="0">
+                <a:solidFill>
+                  <a:srgbClr val="C00000"/>
+                </a:solidFill>
+              </a:rPr>
+              <a:t>hierarchies</a:t>
+            </a:r>
+            <a:r>
+              <a:rPr lang="de-DE" sz="1200" b="1" dirty="0" smtClean="0">
+                <a:solidFill>
+                  <a:srgbClr val="C00000"/>
+                </a:solidFill>
+              </a:rPr>
+              <a:t> </a:t>
+            </a:r>
+            <a:r>
+              <a:rPr lang="de-DE" sz="1200" b="1" dirty="0" smtClean="0">
+                <a:solidFill>
+                  <a:srgbClr val="C00000"/>
+                </a:solidFill>
+              </a:rPr>
+              <a:t>of</a:t>
+            </a:r>
+            <a:r>
+              <a:rPr lang="de-DE" sz="1200" b="1" dirty="0" smtClean="0">
+                <a:solidFill>
+                  <a:srgbClr val="C00000"/>
+                </a:solidFill>
+              </a:rPr>
+              <a:t> </a:t>
+            </a:r>
+            <a:r>
+              <a:rPr lang="de-DE" sz="1200" b="1" dirty="0" smtClean="0">
+                <a:solidFill>
+                  <a:srgbClr val="C00000"/>
+                </a:solidFill>
+              </a:rPr>
+              <a:t>controllers</a:t>
+            </a:r>
+            <a:r>
+              <a:rPr lang="de-DE" sz="1200" b="1" dirty="0" smtClean="0">
+                <a:solidFill>
+                  <a:srgbClr val="C00000"/>
+                </a:solidFill>
+              </a:rPr>
+              <a:t>.</a:t>
+            </a:r>
+            <a:endParaRPr lang="en-US" sz="1200" b="1" dirty="0">
+              <a:solidFill>
+                <a:srgbClr val="C00000"/>
+              </a:solidFill>
+            </a:endParaRPr>
+          </a:p>
+        </p:txBody>
+      </p:sp>
+      <p:cxnSp>
+        <p:nvCxnSpPr>
+          <p:cNvPr id="20" name="Gerade Verbindung mit Pfeil 19">
+            <a:extLst>
+              <a:ext uri="{FF2B5EF4-FFF2-40B4-BE49-F238E27FC236}">
+                <a16:creationId xmlns:a16="http://schemas.microsoft.com/office/drawing/2014/main" id="{C9A631E0-5FDC-40B9-B437-86D216BBDCC2}"/>
+              </a:ext>
+            </a:extLst>
+          </p:cNvPr>
+          <p:cNvCxnSpPr>
+            <a:cxnSpLocks/>
+          </p:cNvCxnSpPr>
+          <p:nvPr/>
+        </p:nvCxnSpPr>
+        <p:spPr>
+          <a:xfrm flipH="1" flipV="1">
+            <a:off x="2987824" y="3501008"/>
+            <a:ext cx="864096" cy="360040"/>
+          </a:xfrm>
+          <a:prstGeom prst="straightConnector1">
+            <a:avLst/>
+          </a:prstGeom>
+          <a:ln w="19050">
+            <a:solidFill>
+              <a:srgbClr val="C00000"/>
+            </a:solidFill>
+            <a:tailEnd type="triangle"/>
+          </a:ln>
+        </p:spPr>
+        <p:style>
+          <a:lnRef idx="1">
+            <a:schemeClr val="accent1"/>
+          </a:lnRef>
+          <a:fillRef idx="0">
+            <a:schemeClr val="accent1"/>
+          </a:fillRef>
+          <a:effectRef idx="0">
+            <a:schemeClr val="accent1"/>
+          </a:effectRef>
+          <a:fontRef idx="minor">
+            <a:schemeClr val="tx1"/>
+          </a:fontRef>
+        </p:style>
+      </p:cxnSp>
+    </p:spTree>
+    <p:extLst>
+      <p:ext uri="{BB962C8B-B14F-4D97-AF65-F5344CB8AC3E}">
+        <p14:creationId xmlns:p14="http://schemas.microsoft.com/office/powerpoint/2010/main" val="3436703735"/>
+      </p:ext>
+    </p:extLst>
+  </p:cSld>
+  <p:clrMapOvr>
+    <a:overrideClrMapping bg1="lt1" tx1="dk1" bg2="lt2" tx2="dk2" accent1="accent1" accent2="accent2" accent3="accent3" accent4="accent4" accent5="accent5" accent6="accent6" hlink="hlink" folHlink="folHlink"/>
   </p:clrMapOvr>
 </p:sld>
 </file>
@@ -4114,4 +4754,90 @@
   <a:objectDefaults/>
   <a:extraClrSchemeLst/>
 </a:theme>
+</file>
+
+<file path=ppt/theme/themeOverride1.xml><?xml version="1.0" encoding="utf-8"?>
+<a:themeOverride xmlns:a="http://schemas.openxmlformats.org/drawingml/2006/main">
+  <a:clrScheme name="Larissa">
+    <a:dk1>
+      <a:sysClr val="windowText" lastClr="000000"/>
+    </a:dk1>
+    <a:lt1>
+      <a:sysClr val="window" lastClr="FFFFFF"/>
+    </a:lt1>
+    <a:dk2>
+      <a:srgbClr val="1F497D"/>
+    </a:dk2>
+    <a:lt2>
+      <a:srgbClr val="EEECE1"/>
+    </a:lt2>
+    <a:accent1>
+      <a:srgbClr val="4F81BD"/>
+    </a:accent1>
+    <a:accent2>
+      <a:srgbClr val="C0504D"/>
+    </a:accent2>
+    <a:accent3>
+      <a:srgbClr val="9BBB59"/>
+    </a:accent3>
+    <a:accent4>
+      <a:srgbClr val="8064A2"/>
+    </a:accent4>
+    <a:accent5>
+      <a:srgbClr val="4BACC6"/>
+    </a:accent5>
+    <a:accent6>
+      <a:srgbClr val="F79646"/>
+    </a:accent6>
+    <a:hlink>
+      <a:srgbClr val="0000FF"/>
+    </a:hlink>
+    <a:folHlink>
+      <a:srgbClr val="800080"/>
+    </a:folHlink>
+  </a:clrScheme>
+</a:themeOverride>
+</file>
+
+<file path=ppt/theme/themeOverride2.xml><?xml version="1.0" encoding="utf-8"?>
+<a:themeOverride xmlns:a="http://schemas.openxmlformats.org/drawingml/2006/main">
+  <a:clrScheme name="Larissa">
+    <a:dk1>
+      <a:sysClr val="windowText" lastClr="000000"/>
+    </a:dk1>
+    <a:lt1>
+      <a:sysClr val="window" lastClr="FFFFFF"/>
+    </a:lt1>
+    <a:dk2>
+      <a:srgbClr val="1F497D"/>
+    </a:dk2>
+    <a:lt2>
+      <a:srgbClr val="EEECE1"/>
+    </a:lt2>
+    <a:accent1>
+      <a:srgbClr val="4F81BD"/>
+    </a:accent1>
+    <a:accent2>
+      <a:srgbClr val="C0504D"/>
+    </a:accent2>
+    <a:accent3>
+      <a:srgbClr val="9BBB59"/>
+    </a:accent3>
+    <a:accent4>
+      <a:srgbClr val="8064A2"/>
+    </a:accent4>
+    <a:accent5>
+      <a:srgbClr val="4BACC6"/>
+    </a:accent5>
+    <a:accent6>
+      <a:srgbClr val="F79646"/>
+    </a:accent6>
+    <a:hlink>
+      <a:srgbClr val="0000FF"/>
+    </a:hlink>
+    <a:folHlink>
+      <a:srgbClr val="800080"/>
+    </a:folHlink>
+  </a:clrScheme>
+</a:themeOverride>
 </file>
</xml_diff>